<commit_message>
final touches, added correlation grap
</commit_message>
<xml_diff>
--- a/PPUdemyPresentation.pptx
+++ b/PPUdemyPresentation.pptx
@@ -19,8 +19,9 @@
     <p:sldId id="270" r:id="rId13"/>
     <p:sldId id="267" r:id="rId14"/>
     <p:sldId id="268" r:id="rId15"/>
-    <p:sldId id="272" r:id="rId16"/>
-    <p:sldId id="273" r:id="rId17"/>
+    <p:sldId id="274" r:id="rId16"/>
+    <p:sldId id="272" r:id="rId17"/>
+    <p:sldId id="273" r:id="rId18"/>
   </p:sldIdLst>
   <p:sldSz cx="12192000" cy="6858000"/>
   <p:notesSz cx="6858000" cy="9144000"/>
@@ -119,6 +120,11 @@
       </a:defRPr>
     </a:lvl9pPr>
   </p:defaultTextStyle>
+  <p:extLst>
+    <p:ext uri="{EFAFB233-063F-42B5-8137-9DF3F51BA10A}">
+      <p15:sldGuideLst xmlns:p15="http://schemas.microsoft.com/office/powerpoint/2012/main"/>
+    </p:ext>
+  </p:extLst>
 </p:presentation>
 </file>
 
@@ -8281,6 +8287,137 @@
           <p:cNvPr id="2" name="Title 1">
             <a:extLst>
               <a:ext uri="{FF2B5EF4-FFF2-40B4-BE49-F238E27FC236}">
+                <a16:creationId xmlns:a16="http://schemas.microsoft.com/office/drawing/2014/main" id="{16F88429-55C9-084D-8A9B-4B57A3DA5854}"/>
+              </a:ext>
+            </a:extLst>
+          </p:cNvPr>
+          <p:cNvSpPr>
+            <a:spLocks noGrp="1"/>
+          </p:cNvSpPr>
+          <p:nvPr>
+            <p:ph type="title"/>
+          </p:nvPr>
+        </p:nvSpPr>
+        <p:spPr/>
+        <p:txBody>
+          <a:bodyPr>
+            <a:normAutofit/>
+          </a:bodyPr>
+          <a:lstStyle/>
+          <a:p>
+            <a:pPr algn="ctr"/>
+            <a:r>
+              <a:rPr lang="en-US" sz="3200" i="1" dirty="0"/>
+              <a:t>Price and Rating correlation</a:t>
+            </a:r>
+            <a:r>
+              <a:rPr lang="en-US" sz="3200" i="1"/>
+              <a:t>: </a:t>
+            </a:r>
+            <a:br>
+              <a:rPr lang="en-US" sz="3200" i="1"/>
+            </a:br>
+            <a:r>
+              <a:rPr lang="en-US" sz="3200" i="1"/>
+              <a:t>very </a:t>
+            </a:r>
+            <a:r>
+              <a:rPr lang="en-US" sz="3200" i="1" dirty="0"/>
+              <a:t>little if any</a:t>
+            </a:r>
+          </a:p>
+        </p:txBody>
+      </p:sp>
+      <p:sp>
+        <p:nvSpPr>
+          <p:cNvPr id="3" name="Content Placeholder 2">
+            <a:extLst>
+              <a:ext uri="{FF2B5EF4-FFF2-40B4-BE49-F238E27FC236}">
+                <a16:creationId xmlns:a16="http://schemas.microsoft.com/office/drawing/2014/main" id="{C906A62E-C21D-BE44-8075-7442E4DEDB6E}"/>
+              </a:ext>
+            </a:extLst>
+          </p:cNvPr>
+          <p:cNvSpPr>
+            <a:spLocks noGrp="1"/>
+          </p:cNvSpPr>
+          <p:nvPr>
+            <p:ph idx="1"/>
+          </p:nvPr>
+        </p:nvSpPr>
+        <p:spPr/>
+        <p:txBody>
+          <a:bodyPr/>
+          <a:lstStyle/>
+          <a:p>
+            <a:endParaRPr lang="en-US"/>
+          </a:p>
+        </p:txBody>
+      </p:sp>
+      <p:pic>
+        <p:nvPicPr>
+          <p:cNvPr id="4" name="Picture 3">
+            <a:extLst>
+              <a:ext uri="{FF2B5EF4-FFF2-40B4-BE49-F238E27FC236}">
+                <a16:creationId xmlns:a16="http://schemas.microsoft.com/office/drawing/2014/main" id="{F1BF465B-B27E-8840-82A0-DC6EE7146775}"/>
+              </a:ext>
+            </a:extLst>
+          </p:cNvPr>
+          <p:cNvPicPr>
+            <a:picLocks noChangeAspect="1"/>
+          </p:cNvPicPr>
+          <p:nvPr/>
+        </p:nvPicPr>
+        <p:blipFill>
+          <a:blip r:embed="rId2"/>
+          <a:stretch>
+            <a:fillRect/>
+          </a:stretch>
+        </p:blipFill>
+        <p:spPr>
+          <a:xfrm>
+            <a:off x="2589212" y="1905000"/>
+            <a:ext cx="8199783" cy="4487640"/>
+          </a:xfrm>
+          <a:prstGeom prst="rect">
+            <a:avLst/>
+          </a:prstGeom>
+        </p:spPr>
+      </p:pic>
+    </p:spTree>
+    <p:extLst>
+      <p:ext uri="{BB962C8B-B14F-4D97-AF65-F5344CB8AC3E}">
+        <p14:creationId xmlns:p14="http://schemas.microsoft.com/office/powerpoint/2010/main" val="836292074"/>
+      </p:ext>
+    </p:extLst>
+  </p:cSld>
+  <p:clrMapOvr>
+    <a:masterClrMapping/>
+  </p:clrMapOvr>
+</p:sld>
+</file>
+
+<file path=ppt/slides/slide16.xml><?xml version="1.0" encoding="utf-8"?>
+<p:sld xmlns:a="http://schemas.openxmlformats.org/drawingml/2006/main" xmlns:r="http://schemas.openxmlformats.org/officeDocument/2006/relationships" xmlns:p="http://schemas.openxmlformats.org/presentationml/2006/main">
+  <p:cSld>
+    <p:spTree>
+      <p:nvGrpSpPr>
+        <p:cNvPr id="1" name=""/>
+        <p:cNvGrpSpPr/>
+        <p:nvPr/>
+      </p:nvGrpSpPr>
+      <p:grpSpPr>
+        <a:xfrm>
+          <a:off x="0" y="0"/>
+          <a:ext cx="0" cy="0"/>
+          <a:chOff x="0" y="0"/>
+          <a:chExt cx="0" cy="0"/>
+        </a:xfrm>
+      </p:grpSpPr>
+      <p:sp>
+        <p:nvSpPr>
+          <p:cNvPr id="2" name="Title 1">
+            <a:extLst>
+              <a:ext uri="{FF2B5EF4-FFF2-40B4-BE49-F238E27FC236}">
                 <a16:creationId xmlns:a16="http://schemas.microsoft.com/office/drawing/2014/main" id="{97622A4D-B73D-6140-8E2D-4EBB31EB09F9}"/>
               </a:ext>
             </a:extLst>
@@ -8394,7 +8531,7 @@
 </p:sld>
 </file>
 
-<file path=ppt/slides/slide16.xml><?xml version="1.0" encoding="utf-8"?>
+<file path=ppt/slides/slide17.xml><?xml version="1.0" encoding="utf-8"?>
 <p:sld xmlns:a="http://schemas.openxmlformats.org/drawingml/2006/main" xmlns:r="http://schemas.openxmlformats.org/officeDocument/2006/relationships" xmlns:p="http://schemas.openxmlformats.org/presentationml/2006/main">
   <p:cSld>
     <p:spTree>

</xml_diff>